<commit_message>
Adjusted box size for generation and viewing PDF files
</commit_message>
<xml_diff>
--- a/Vizualizacija/MyPresentation.pptx
+++ b/Vizualizacija/MyPresentation.pptx
@@ -3086,7 +3086,7 @@
         <p:spPr>
           <a:xfrm>
             <a:off x="252820" y="1702661"/>
-            <a:ext cx="1548000" cy="1938992"/>
+            <a:ext cx="1548000" cy="1944000"/>
           </a:xfrm>
           <a:prstGeom prst="rect">
             <a:avLst/>
@@ -3321,7 +3321,7 @@
         <p:spPr>
           <a:xfrm>
             <a:off x="2152780" y="1702661"/>
-            <a:ext cx="1548000" cy="1938992"/>
+            <a:ext cx="1548000" cy="1944000"/>
           </a:xfrm>
           <a:prstGeom prst="rect">
             <a:avLst/>
@@ -3599,7 +3599,7 @@
         <p:spPr>
           <a:xfrm>
             <a:off x="4073100" y="1702661"/>
-            <a:ext cx="1548000" cy="1938992"/>
+            <a:ext cx="1548000" cy="1944000"/>
           </a:xfrm>
           <a:prstGeom prst="rect">
             <a:avLst/>
@@ -3840,7 +3840,7 @@
         <p:spPr>
           <a:xfrm>
             <a:off x="5972249" y="1702661"/>
-            <a:ext cx="1548000" cy="1938992"/>
+            <a:ext cx="1548000" cy="1944000"/>
           </a:xfrm>
           <a:prstGeom prst="rect">
             <a:avLst/>
@@ -4301,7 +4301,7 @@
         <p:spPr>
           <a:xfrm>
             <a:off x="4081406" y="4803591"/>
-            <a:ext cx="1548000" cy="1938992"/>
+            <a:ext cx="1548000" cy="1944000"/>
           </a:xfrm>
           <a:prstGeom prst="rect">
             <a:avLst/>
@@ -4811,7 +4811,7 @@
         <p:spPr>
           <a:xfrm>
             <a:off x="7863092" y="4803591"/>
-            <a:ext cx="1548000" cy="1938992"/>
+            <a:ext cx="1548000" cy="1944000"/>
           </a:xfrm>
           <a:prstGeom prst="rect">
             <a:avLst/>
@@ -5063,7 +5063,7 @@
         <p:spPr>
           <a:xfrm>
             <a:off x="5972249" y="4803591"/>
-            <a:ext cx="1548000" cy="1938992"/>
+            <a:ext cx="1548000" cy="1944000"/>
           </a:xfrm>
           <a:prstGeom prst="rect">
             <a:avLst/>
@@ -5346,7 +5346,7 @@
         <p:spPr>
           <a:xfrm>
             <a:off x="7863092" y="1697653"/>
-            <a:ext cx="1548000" cy="1938992"/>
+            <a:ext cx="1548000" cy="1944000"/>
           </a:xfrm>
           <a:prstGeom prst="rect">
             <a:avLst/>
@@ -5675,8 +5675,8 @@
         </p:nvSpPr>
         <p:spPr>
           <a:xfrm>
-            <a:off x="5176990" y="2937386"/>
-            <a:ext cx="413123" cy="189516"/>
+            <a:off x="5184175" y="2942406"/>
+            <a:ext cx="396000" cy="180000"/>
           </a:xfrm>
           <a:prstGeom prst="rect">
             <a:avLst/>
@@ -5729,8 +5729,8 @@
         </p:nvSpPr>
         <p:spPr>
           <a:xfrm>
-            <a:off x="4171355" y="2937386"/>
-            <a:ext cx="974648" cy="189516"/>
+            <a:off x="4134205" y="2942406"/>
+            <a:ext cx="972000" cy="180000"/>
           </a:xfrm>
           <a:prstGeom prst="rect">
             <a:avLst/>
@@ -5783,8 +5783,8 @@
         </p:nvSpPr>
         <p:spPr>
           <a:xfrm>
-            <a:off x="3223036" y="2937911"/>
-            <a:ext cx="413123" cy="189516"/>
+            <a:off x="3276932" y="2942406"/>
+            <a:ext cx="396000" cy="180000"/>
           </a:xfrm>
           <a:prstGeom prst="rect">
             <a:avLst/>
@@ -5837,8 +5837,8 @@
         </p:nvSpPr>
         <p:spPr>
           <a:xfrm>
-            <a:off x="2217401" y="2937911"/>
-            <a:ext cx="974648" cy="189516"/>
+            <a:off x="2226962" y="2942406"/>
+            <a:ext cx="972000" cy="180000"/>
           </a:xfrm>
           <a:prstGeom prst="rect">
             <a:avLst/>
@@ -5891,8 +5891,8 @@
         </p:nvSpPr>
         <p:spPr>
           <a:xfrm>
-            <a:off x="1308182" y="2937386"/>
-            <a:ext cx="413123" cy="189516"/>
+            <a:off x="1343313" y="2942406"/>
+            <a:ext cx="396000" cy="180000"/>
           </a:xfrm>
           <a:prstGeom prst="rect">
             <a:avLst/>
@@ -5945,8 +5945,8 @@
         </p:nvSpPr>
         <p:spPr>
           <a:xfrm>
-            <a:off x="302547" y="2937386"/>
-            <a:ext cx="974648" cy="189516"/>
+            <a:off x="295237" y="2942406"/>
+            <a:ext cx="972000" cy="180000"/>
           </a:xfrm>
           <a:prstGeom prst="rect">
             <a:avLst/>
@@ -5999,8 +5999,8 @@
         </p:nvSpPr>
         <p:spPr>
           <a:xfrm>
-            <a:off x="1339169" y="6041992"/>
-            <a:ext cx="413123" cy="189516"/>
+            <a:off x="1343313" y="6044431"/>
+            <a:ext cx="396000" cy="180000"/>
           </a:xfrm>
           <a:prstGeom prst="rect">
             <a:avLst/>
@@ -6053,8 +6053,8 @@
         </p:nvSpPr>
         <p:spPr>
           <a:xfrm>
-            <a:off x="333534" y="6041992"/>
-            <a:ext cx="974648" cy="189516"/>
+            <a:off x="295237" y="6044431"/>
+            <a:ext cx="972000" cy="180000"/>
           </a:xfrm>
           <a:prstGeom prst="rect">
             <a:avLst/>
@@ -6107,8 +6107,8 @@
         </p:nvSpPr>
         <p:spPr>
           <a:xfrm>
-            <a:off x="3243825" y="6046871"/>
-            <a:ext cx="413123" cy="189516"/>
+            <a:off x="3276932" y="6044431"/>
+            <a:ext cx="396000" cy="180000"/>
           </a:xfrm>
           <a:prstGeom prst="rect">
             <a:avLst/>
@@ -6161,8 +6161,8 @@
         </p:nvSpPr>
         <p:spPr>
           <a:xfrm>
-            <a:off x="2238190" y="6046871"/>
-            <a:ext cx="974648" cy="189516"/>
+            <a:off x="2217401" y="6044431"/>
+            <a:ext cx="972000" cy="180000"/>
           </a:xfrm>
           <a:prstGeom prst="rect">
             <a:avLst/>
@@ -6213,8 +6213,8 @@
         </p:nvSpPr>
         <p:spPr>
           <a:xfrm>
-            <a:off x="5140663" y="6041992"/>
-            <a:ext cx="413123" cy="189516"/>
+            <a:off x="5186053" y="6044431"/>
+            <a:ext cx="396000" cy="180000"/>
           </a:xfrm>
           <a:prstGeom prst="rect">
             <a:avLst/>
@@ -6265,8 +6265,8 @@
         </p:nvSpPr>
         <p:spPr>
           <a:xfrm>
-            <a:off x="4135028" y="6041992"/>
-            <a:ext cx="974648" cy="189516"/>
+            <a:off x="4128548" y="6044431"/>
+            <a:ext cx="972000" cy="180000"/>
           </a:xfrm>
           <a:prstGeom prst="rect">
             <a:avLst/>
@@ -6319,8 +6319,8 @@
         </p:nvSpPr>
         <p:spPr>
           <a:xfrm>
-            <a:off x="7043745" y="6046871"/>
-            <a:ext cx="413123" cy="189516"/>
+            <a:off x="7085641" y="6044431"/>
+            <a:ext cx="396000" cy="180000"/>
           </a:xfrm>
           <a:prstGeom prst="rect">
             <a:avLst/>
@@ -6373,8 +6373,8 @@
         </p:nvSpPr>
         <p:spPr>
           <a:xfrm>
-            <a:off x="6038110" y="6046871"/>
-            <a:ext cx="974648" cy="189516"/>
+            <a:off x="6032824" y="6044431"/>
+            <a:ext cx="972000" cy="180000"/>
           </a:xfrm>
           <a:prstGeom prst="rect">
             <a:avLst/>
@@ -6427,8 +6427,8 @@
         </p:nvSpPr>
         <p:spPr>
           <a:xfrm>
-            <a:off x="8918164" y="6041992"/>
-            <a:ext cx="413123" cy="189516"/>
+            <a:off x="8965346" y="6044431"/>
+            <a:ext cx="396000" cy="180000"/>
           </a:xfrm>
           <a:prstGeom prst="rect">
             <a:avLst/>
@@ -6481,8 +6481,8 @@
         </p:nvSpPr>
         <p:spPr>
           <a:xfrm>
-            <a:off x="7912529" y="6041992"/>
-            <a:ext cx="974648" cy="189516"/>
+            <a:off x="7912529" y="6044431"/>
+            <a:ext cx="972000" cy="180000"/>
           </a:xfrm>
           <a:prstGeom prst="rect">
             <a:avLst/>
@@ -6535,8 +6535,8 @@
         </p:nvSpPr>
         <p:spPr>
           <a:xfrm>
-            <a:off x="8949151" y="2937386"/>
-            <a:ext cx="413123" cy="189516"/>
+            <a:off x="8965346" y="2942406"/>
+            <a:ext cx="396000" cy="180000"/>
           </a:xfrm>
           <a:prstGeom prst="rect">
             <a:avLst/>
@@ -6589,8 +6589,8 @@
         </p:nvSpPr>
         <p:spPr>
           <a:xfrm>
-            <a:off x="7943516" y="2937386"/>
-            <a:ext cx="974648" cy="189516"/>
+            <a:off x="7915376" y="2942406"/>
+            <a:ext cx="972000" cy="180000"/>
           </a:xfrm>
           <a:prstGeom prst="rect">
             <a:avLst/>
@@ -6643,8 +6643,8 @@
         </p:nvSpPr>
         <p:spPr>
           <a:xfrm>
-            <a:off x="7043745" y="2937386"/>
-            <a:ext cx="413123" cy="189516"/>
+            <a:off x="7088132" y="2942406"/>
+            <a:ext cx="396000" cy="180000"/>
           </a:xfrm>
           <a:prstGeom prst="rect">
             <a:avLst/>
@@ -6697,8 +6697,8 @@
         </p:nvSpPr>
         <p:spPr>
           <a:xfrm>
-            <a:off x="6038110" y="2937386"/>
-            <a:ext cx="974648" cy="189516"/>
+            <a:off x="6051005" y="2942406"/>
+            <a:ext cx="972000" cy="180000"/>
           </a:xfrm>
           <a:prstGeom prst="rect">
             <a:avLst/>
@@ -6735,7 +6735,11 @@
             <a:pPr algn="ctr"/>
             <a:r>
               <a:rPr lang="sl-SI" sz="1000" dirty="0" smtClean="0"/>
-              <a:t>GENERATE PDF</a:t>
+              <a:t>GENERATE </a:t>
+            </a:r>
+            <a:r>
+              <a:rPr lang="sl-SI" sz="1000" dirty="0" smtClean="0"/>
+              <a:t>PDF</a:t>
             </a:r>
             <a:endParaRPr lang="sl-SI" sz="1000" dirty="0"/>
           </a:p>

</xml_diff>